<commit_message>
updated presentations/CosmosAIGraph-v2 pptx and pdf
</commit_message>
<xml_diff>
--- a/presentations/CosmosAIGraph-v2.pptx
+++ b/presentations/CosmosAIGraph-v2.pptx
@@ -275,7 +275,7 @@
           <a:p>
             <a:fld id="{1D36DD91-353E-44A9-8B3B-B0665B534353}" type="datetimeFigureOut">
               <a:rPr lang="en-US" smtClean="0"/>
-              <a:t>5/3/2024</a:t>
+              <a:t>5/6/2024</a:t>
             </a:fld>
             <a:endParaRPr lang="en-US"/>
           </a:p>
@@ -473,7 +473,7 @@
           <a:p>
             <a:fld id="{1D36DD91-353E-44A9-8B3B-B0665B534353}" type="datetimeFigureOut">
               <a:rPr lang="en-US" smtClean="0"/>
-              <a:t>5/3/2024</a:t>
+              <a:t>5/6/2024</a:t>
             </a:fld>
             <a:endParaRPr lang="en-US"/>
           </a:p>
@@ -681,7 +681,7 @@
           <a:p>
             <a:fld id="{1D36DD91-353E-44A9-8B3B-B0665B534353}" type="datetimeFigureOut">
               <a:rPr lang="en-US" smtClean="0"/>
-              <a:t>5/3/2024</a:t>
+              <a:t>5/6/2024</a:t>
             </a:fld>
             <a:endParaRPr lang="en-US"/>
           </a:p>
@@ -879,7 +879,7 @@
           <a:p>
             <a:fld id="{1D36DD91-353E-44A9-8B3B-B0665B534353}" type="datetimeFigureOut">
               <a:rPr lang="en-US" smtClean="0"/>
-              <a:t>5/3/2024</a:t>
+              <a:t>5/6/2024</a:t>
             </a:fld>
             <a:endParaRPr lang="en-US"/>
           </a:p>
@@ -1154,7 +1154,7 @@
           <a:p>
             <a:fld id="{1D36DD91-353E-44A9-8B3B-B0665B534353}" type="datetimeFigureOut">
               <a:rPr lang="en-US" smtClean="0"/>
-              <a:t>5/3/2024</a:t>
+              <a:t>5/6/2024</a:t>
             </a:fld>
             <a:endParaRPr lang="en-US"/>
           </a:p>
@@ -1419,7 +1419,7 @@
           <a:p>
             <a:fld id="{1D36DD91-353E-44A9-8B3B-B0665B534353}" type="datetimeFigureOut">
               <a:rPr lang="en-US" smtClean="0"/>
-              <a:t>5/3/2024</a:t>
+              <a:t>5/6/2024</a:t>
             </a:fld>
             <a:endParaRPr lang="en-US"/>
           </a:p>
@@ -1831,7 +1831,7 @@
           <a:p>
             <a:fld id="{1D36DD91-353E-44A9-8B3B-B0665B534353}" type="datetimeFigureOut">
               <a:rPr lang="en-US" smtClean="0"/>
-              <a:t>5/3/2024</a:t>
+              <a:t>5/6/2024</a:t>
             </a:fld>
             <a:endParaRPr lang="en-US"/>
           </a:p>
@@ -1972,7 +1972,7 @@
           <a:p>
             <a:fld id="{1D36DD91-353E-44A9-8B3B-B0665B534353}" type="datetimeFigureOut">
               <a:rPr lang="en-US" smtClean="0"/>
-              <a:t>5/3/2024</a:t>
+              <a:t>5/6/2024</a:t>
             </a:fld>
             <a:endParaRPr lang="en-US"/>
           </a:p>
@@ -2085,7 +2085,7 @@
           <a:p>
             <a:fld id="{1D36DD91-353E-44A9-8B3B-B0665B534353}" type="datetimeFigureOut">
               <a:rPr lang="en-US" smtClean="0"/>
-              <a:t>5/3/2024</a:t>
+              <a:t>5/6/2024</a:t>
             </a:fld>
             <a:endParaRPr lang="en-US"/>
           </a:p>
@@ -2396,7 +2396,7 @@
           <a:p>
             <a:fld id="{1D36DD91-353E-44A9-8B3B-B0665B534353}" type="datetimeFigureOut">
               <a:rPr lang="en-US" smtClean="0"/>
-              <a:t>5/3/2024</a:t>
+              <a:t>5/6/2024</a:t>
             </a:fld>
             <a:endParaRPr lang="en-US"/>
           </a:p>
@@ -2684,7 +2684,7 @@
           <a:p>
             <a:fld id="{1D36DD91-353E-44A9-8B3B-B0665B534353}" type="datetimeFigureOut">
               <a:rPr lang="en-US" smtClean="0"/>
-              <a:t>5/3/2024</a:t>
+              <a:t>5/6/2024</a:t>
             </a:fld>
             <a:endParaRPr lang="en-US"/>
           </a:p>
@@ -2925,7 +2925,7 @@
           <a:p>
             <a:fld id="{1D36DD91-353E-44A9-8B3B-B0665B534353}" type="datetimeFigureOut">
               <a:rPr lang="en-US" smtClean="0"/>
-              <a:t>5/3/2024</a:t>
+              <a:t>5/6/2024</a:t>
             </a:fld>
             <a:endParaRPr lang="en-US"/>
           </a:p>
@@ -4458,7 +4458,27 @@
             </a:pPr>
             <a:r>
               <a:rPr lang="en-US" dirty="0"/>
-              <a:t>Specifically Azure OpenAI, Chat-GPT, and Vector Search</a:t>
+              <a:t>Specifically </a:t>
+            </a:r>
+            <a:r>
+              <a:rPr lang="en-US" b="1" dirty="0"/>
+              <a:t>Azure OpenAI</a:t>
+            </a:r>
+            <a:r>
+              <a:rPr lang="en-US" dirty="0"/>
+              <a:t>, </a:t>
+            </a:r>
+            <a:r>
+              <a:rPr lang="en-US" b="1" dirty="0"/>
+              <a:t>Chat-GPT</a:t>
+            </a:r>
+            <a:r>
+              <a:rPr lang="en-US" dirty="0"/>
+              <a:t>, and </a:t>
+            </a:r>
+            <a:r>
+              <a:rPr lang="en-US" b="1" dirty="0"/>
+              <a:t>Vector Search</a:t>
             </a:r>
           </a:p>
           <a:p>
@@ -4711,10 +4731,17 @@
           <a:p>
             <a:pPr algn="l"/>
             <a:r>
+              <a:rPr lang="en-US" sz="3200" b="1" dirty="0"/>
+              <a:t>What is </a:t>
+            </a:r>
+            <a:r>
               <a:rPr lang="en-US" sz="3200" b="1" dirty="0" err="1"/>
               <a:t>CosmosAIGraph</a:t>
             </a:r>
-            <a:endParaRPr lang="en-US" sz="3200" b="1" dirty="0"/>
+            <a:r>
+              <a:rPr lang="en-US" sz="3200" b="1" dirty="0"/>
+              <a:t>?</a:t>
+            </a:r>
           </a:p>
         </p:txBody>
       </p:sp>
@@ -4804,10 +4831,7 @@
               <a:rPr lang="en-US" sz="2200" b="1" dirty="0"/>
               <a:t>Vector Search</a:t>
             </a:r>
-            <a:r>
-              <a:rPr lang="en-US" sz="2200" dirty="0"/>
-              <a:t>, “NoSQL”</a:t>
-            </a:r>
+            <a:endParaRPr lang="en-US" sz="2200" dirty="0"/>
           </a:p>
           <a:p>
             <a:pPr marL="800100" lvl="1" indent="-342900" algn="l">
@@ -5477,7 +5501,7 @@
             </a:pPr>
             <a:r>
               <a:rPr lang="en-US" sz="3800" dirty="0"/>
-              <a:t>Use typical NoSQL design patterns</a:t>
+              <a:t>Use typical NoSQL design patterns, JSON documents</a:t>
             </a:r>
           </a:p>
           <a:p>
@@ -5509,7 +5533,7 @@
             </a:pPr>
             <a:r>
               <a:rPr lang="en-US" sz="4200" b="1" dirty="0"/>
-              <a:t>Define your OWL Graph Schema</a:t>
+              <a:t>Define your Graph Schema</a:t>
             </a:r>
           </a:p>
           <a:p>
@@ -5591,7 +5615,7 @@
               <a:buChar char="•"/>
             </a:pPr>
             <a:r>
-              <a:rPr lang="en-US" sz="3800" dirty="0"/>
+              <a:rPr lang="en-US" sz="3800" b="1" i="1" dirty="0"/>
               <a:t>The graph is strictly an in-memory concept; it doesn’t exist on disk</a:t>
             </a:r>
           </a:p>

</xml_diff>

<commit_message>
Updated presentations/CosmosAIGraph-v2.pptx and pdf
</commit_message>
<xml_diff>
--- a/presentations/CosmosAIGraph-v2.pptx
+++ b/presentations/CosmosAIGraph-v2.pptx
@@ -4779,7 +4779,19 @@
             </a:pPr>
             <a:r>
               <a:rPr lang="en-US" dirty="0"/>
-              <a:t>It’s an open-source reusable design and set of reference implementations</a:t>
+              <a:t>It’s an </a:t>
+            </a:r>
+            <a:r>
+              <a:rPr lang="en-US" b="1" dirty="0"/>
+              <a:t>open-source</a:t>
+            </a:r>
+            <a:r>
+              <a:rPr lang="en-US" dirty="0"/>
+              <a:t> reusable design and set of </a:t>
+            </a:r>
+            <a:r>
+              <a:rPr lang="en-US" b="1" dirty="0"/>
+              <a:t>reference implementations</a:t>
             </a:r>
           </a:p>
           <a:p>
@@ -4995,8 +5007,16 @@
               <a:buChar char="•"/>
             </a:pPr>
             <a:r>
+              <a:rPr lang="en-US" b="1" dirty="0"/>
+              <a:t>RDF</a:t>
+            </a:r>
+            <a:r>
               <a:rPr lang="en-US" dirty="0"/>
-              <a:t>RDF is a standard industry solution for Knowledge Graphs</a:t>
+              <a:t> is a standard industry solution for </a:t>
+            </a:r>
+            <a:r>
+              <a:rPr lang="en-US" b="1" dirty="0"/>
+              <a:t>Knowledge Graphs</a:t>
             </a:r>
           </a:p>
           <a:p>

</xml_diff>

<commit_message>
Updated CosmosAIGraph-v2.pptx and pdf
</commit_message>
<xml_diff>
--- a/presentations/CosmosAIGraph-v2.pptx
+++ b/presentations/CosmosAIGraph-v2.pptx
@@ -4510,7 +4510,15 @@
             </a:pPr>
             <a:r>
               <a:rPr lang="en-US" dirty="0"/>
-              <a:t>These are the target workload for </a:t>
+              <a:t>These are the </a:t>
+            </a:r>
+            <a:r>
+              <a:rPr lang="en-US"/>
+              <a:t>target workloads </a:t>
+            </a:r>
+            <a:r>
+              <a:rPr lang="en-US" dirty="0"/>
+              <a:t>for </a:t>
             </a:r>
             <a:r>
               <a:rPr lang="en-US" dirty="0" err="1"/>
@@ -5316,7 +5324,7 @@
               <a:rPr lang="en-US" dirty="0">
                 <a:sym typeface="Wingdings" panose="05000000000000000000" pitchFamily="2" charset="2"/>
               </a:rPr>
-              <a:t> )</a:t>
+              <a:t> ). </a:t>
             </a:r>
           </a:p>
           <a:p>
@@ -5379,7 +5387,7 @@
               <a:rPr lang="en-US" dirty="0">
                 <a:sym typeface="Wingdings" panose="05000000000000000000" pitchFamily="2" charset="2"/>
               </a:rPr>
-              <a:t> – A python library that implements an in-memory RDF graph</a:t>
+              <a:t> – A python library that implements a mutable in-memory RDF graph</a:t>
             </a:r>
             <a:endParaRPr lang="en-US" dirty="0"/>
           </a:p>

</xml_diff>

<commit_message>
updated private/docs/CosmosAIGraph-v2.pptx and pdf
</commit_message>
<xml_diff>
--- a/presentations/CosmosAIGraph-v2.pptx
+++ b/presentations/CosmosAIGraph-v2.pptx
@@ -4431,7 +4431,7 @@
         </p:spPr>
         <p:txBody>
           <a:bodyPr>
-            <a:normAutofit fontScale="92500" lnSpcReduction="10000"/>
+            <a:normAutofit lnSpcReduction="10000"/>
           </a:bodyPr>
           <a:lstStyle/>
           <a:p>
@@ -4510,15 +4510,7 @@
             </a:pPr>
             <a:r>
               <a:rPr lang="en-US" dirty="0"/>
-              <a:t>These are the </a:t>
-            </a:r>
-            <a:r>
-              <a:rPr lang="en-US"/>
-              <a:t>target workloads </a:t>
-            </a:r>
-            <a:r>
-              <a:rPr lang="en-US" dirty="0"/>
-              <a:t>for </a:t>
+              <a:t>These are the target workloads for </a:t>
             </a:r>
             <a:r>
               <a:rPr lang="en-US" dirty="0" err="1"/>
@@ -4571,12 +4563,12 @@
               <a:buChar char="•"/>
             </a:pPr>
             <a:r>
-              <a:rPr lang="en-US" dirty="0">
+              <a:rPr lang="en-US" sz="1700" dirty="0">
                 <a:hlinkClick r:id="rId2"/>
               </a:rPr>
               <a:t>https://devblogs.microsoft.com/cosmosdb/altgraph-graph-workloads-with-azure-cosmos-db-for-nosql/</a:t>
             </a:r>
-            <a:endParaRPr lang="en-US" dirty="0"/>
+            <a:endParaRPr lang="en-US" sz="1700" dirty="0"/>
           </a:p>
           <a:p>
             <a:pPr marL="800100" lvl="1" indent="-342900" algn="l">

</xml_diff>

<commit_message>
Updated CosmosAIGraph-v2 presentation with YouTube link
</commit_message>
<xml_diff>
--- a/presentations/CosmosAIGraph-v2.pptx
+++ b/presentations/CosmosAIGraph-v2.pptx
@@ -277,7 +277,7 @@
           <a:p>
             <a:fld id="{1D36DD91-353E-44A9-8B3B-B0665B534353}" type="datetimeFigureOut">
               <a:rPr lang="en-US" smtClean="0"/>
-              <a:t>6/13/2024</a:t>
+              <a:t>6/24/2024</a:t>
             </a:fld>
             <a:endParaRPr lang="en-US"/>
           </a:p>
@@ -475,7 +475,7 @@
           <a:p>
             <a:fld id="{1D36DD91-353E-44A9-8B3B-B0665B534353}" type="datetimeFigureOut">
               <a:rPr lang="en-US" smtClean="0"/>
-              <a:t>6/13/2024</a:t>
+              <a:t>6/24/2024</a:t>
             </a:fld>
             <a:endParaRPr lang="en-US"/>
           </a:p>
@@ -683,7 +683,7 @@
           <a:p>
             <a:fld id="{1D36DD91-353E-44A9-8B3B-B0665B534353}" type="datetimeFigureOut">
               <a:rPr lang="en-US" smtClean="0"/>
-              <a:t>6/13/2024</a:t>
+              <a:t>6/24/2024</a:t>
             </a:fld>
             <a:endParaRPr lang="en-US"/>
           </a:p>
@@ -881,7 +881,7 @@
           <a:p>
             <a:fld id="{1D36DD91-353E-44A9-8B3B-B0665B534353}" type="datetimeFigureOut">
               <a:rPr lang="en-US" smtClean="0"/>
-              <a:t>6/13/2024</a:t>
+              <a:t>6/24/2024</a:t>
             </a:fld>
             <a:endParaRPr lang="en-US"/>
           </a:p>
@@ -1156,7 +1156,7 @@
           <a:p>
             <a:fld id="{1D36DD91-353E-44A9-8B3B-B0665B534353}" type="datetimeFigureOut">
               <a:rPr lang="en-US" smtClean="0"/>
-              <a:t>6/13/2024</a:t>
+              <a:t>6/24/2024</a:t>
             </a:fld>
             <a:endParaRPr lang="en-US"/>
           </a:p>
@@ -1421,7 +1421,7 @@
           <a:p>
             <a:fld id="{1D36DD91-353E-44A9-8B3B-B0665B534353}" type="datetimeFigureOut">
               <a:rPr lang="en-US" smtClean="0"/>
-              <a:t>6/13/2024</a:t>
+              <a:t>6/24/2024</a:t>
             </a:fld>
             <a:endParaRPr lang="en-US"/>
           </a:p>
@@ -1833,7 +1833,7 @@
           <a:p>
             <a:fld id="{1D36DD91-353E-44A9-8B3B-B0665B534353}" type="datetimeFigureOut">
               <a:rPr lang="en-US" smtClean="0"/>
-              <a:t>6/13/2024</a:t>
+              <a:t>6/24/2024</a:t>
             </a:fld>
             <a:endParaRPr lang="en-US"/>
           </a:p>
@@ -1974,7 +1974,7 @@
           <a:p>
             <a:fld id="{1D36DD91-353E-44A9-8B3B-B0665B534353}" type="datetimeFigureOut">
               <a:rPr lang="en-US" smtClean="0"/>
-              <a:t>6/13/2024</a:t>
+              <a:t>6/24/2024</a:t>
             </a:fld>
             <a:endParaRPr lang="en-US"/>
           </a:p>
@@ -2087,7 +2087,7 @@
           <a:p>
             <a:fld id="{1D36DD91-353E-44A9-8B3B-B0665B534353}" type="datetimeFigureOut">
               <a:rPr lang="en-US" smtClean="0"/>
-              <a:t>6/13/2024</a:t>
+              <a:t>6/24/2024</a:t>
             </a:fld>
             <a:endParaRPr lang="en-US"/>
           </a:p>
@@ -2398,7 +2398,7 @@
           <a:p>
             <a:fld id="{1D36DD91-353E-44A9-8B3B-B0665B534353}" type="datetimeFigureOut">
               <a:rPr lang="en-US" smtClean="0"/>
-              <a:t>6/13/2024</a:t>
+              <a:t>6/24/2024</a:t>
             </a:fld>
             <a:endParaRPr lang="en-US"/>
           </a:p>
@@ -2686,7 +2686,7 @@
           <a:p>
             <a:fld id="{1D36DD91-353E-44A9-8B3B-B0665B534353}" type="datetimeFigureOut">
               <a:rPr lang="en-US" smtClean="0"/>
-              <a:t>6/13/2024</a:t>
+              <a:t>6/24/2024</a:t>
             </a:fld>
             <a:endParaRPr lang="en-US"/>
           </a:p>
@@ -2927,7 +2927,7 @@
           <a:p>
             <a:fld id="{1D36DD91-353E-44A9-8B3B-B0665B534353}" type="datetimeFigureOut">
               <a:rPr lang="en-US" smtClean="0"/>
-              <a:t>6/13/2024</a:t>
+              <a:t>6/24/2024</a:t>
             </a:fld>
             <a:endParaRPr lang="en-US"/>
           </a:p>
@@ -3404,7 +3404,7 @@
         </p:spPr>
         <p:txBody>
           <a:bodyPr>
-            <a:normAutofit/>
+            <a:normAutofit fontScale="85000" lnSpcReduction="20000"/>
           </a:bodyPr>
           <a:lstStyle/>
           <a:p>
@@ -3429,7 +3429,13 @@
               <a:rPr lang="en-US" sz="2000" b="1" dirty="0" err="1"/>
               <a:t>caig</a:t>
             </a:r>
-            <a:endParaRPr lang="en-US" sz="2000" dirty="0"/>
+            <a:endParaRPr lang="en-US" sz="2000" b="1" dirty="0"/>
+          </a:p>
+          <a:p>
+            <a:r>
+              <a:rPr lang="en-US" sz="2000" dirty="0"/>
+              <a:t>Video: https://www.youtube.com/watch?v=0alvRmEgIpQ</a:t>
+            </a:r>
           </a:p>
           <a:p>
             <a:endParaRPr lang="en-US" dirty="0"/>

</xml_diff>

<commit_message>
Documentation and presentatiion updates - OmniRAG replaces HybridRAG
</commit_message>
<xml_diff>
--- a/presentations/CosmosAIGraph-v2.pptx
+++ b/presentations/CosmosAIGraph-v2.pptx
@@ -277,7 +277,7 @@
           <a:p>
             <a:fld id="{1D36DD91-353E-44A9-8B3B-B0665B534353}" type="datetimeFigureOut">
               <a:rPr lang="en-US" smtClean="0"/>
-              <a:t>6/24/2024</a:t>
+              <a:t>7/19/2024</a:t>
             </a:fld>
             <a:endParaRPr lang="en-US"/>
           </a:p>
@@ -475,7 +475,7 @@
           <a:p>
             <a:fld id="{1D36DD91-353E-44A9-8B3B-B0665B534353}" type="datetimeFigureOut">
               <a:rPr lang="en-US" smtClean="0"/>
-              <a:t>6/24/2024</a:t>
+              <a:t>7/19/2024</a:t>
             </a:fld>
             <a:endParaRPr lang="en-US"/>
           </a:p>
@@ -683,7 +683,7 @@
           <a:p>
             <a:fld id="{1D36DD91-353E-44A9-8B3B-B0665B534353}" type="datetimeFigureOut">
               <a:rPr lang="en-US" smtClean="0"/>
-              <a:t>6/24/2024</a:t>
+              <a:t>7/19/2024</a:t>
             </a:fld>
             <a:endParaRPr lang="en-US"/>
           </a:p>
@@ -881,7 +881,7 @@
           <a:p>
             <a:fld id="{1D36DD91-353E-44A9-8B3B-B0665B534353}" type="datetimeFigureOut">
               <a:rPr lang="en-US" smtClean="0"/>
-              <a:t>6/24/2024</a:t>
+              <a:t>7/19/2024</a:t>
             </a:fld>
             <a:endParaRPr lang="en-US"/>
           </a:p>
@@ -1156,7 +1156,7 @@
           <a:p>
             <a:fld id="{1D36DD91-353E-44A9-8B3B-B0665B534353}" type="datetimeFigureOut">
               <a:rPr lang="en-US" smtClean="0"/>
-              <a:t>6/24/2024</a:t>
+              <a:t>7/19/2024</a:t>
             </a:fld>
             <a:endParaRPr lang="en-US"/>
           </a:p>
@@ -1421,7 +1421,7 @@
           <a:p>
             <a:fld id="{1D36DD91-353E-44A9-8B3B-B0665B534353}" type="datetimeFigureOut">
               <a:rPr lang="en-US" smtClean="0"/>
-              <a:t>6/24/2024</a:t>
+              <a:t>7/19/2024</a:t>
             </a:fld>
             <a:endParaRPr lang="en-US"/>
           </a:p>
@@ -1833,7 +1833,7 @@
           <a:p>
             <a:fld id="{1D36DD91-353E-44A9-8B3B-B0665B534353}" type="datetimeFigureOut">
               <a:rPr lang="en-US" smtClean="0"/>
-              <a:t>6/24/2024</a:t>
+              <a:t>7/19/2024</a:t>
             </a:fld>
             <a:endParaRPr lang="en-US"/>
           </a:p>
@@ -1974,7 +1974,7 @@
           <a:p>
             <a:fld id="{1D36DD91-353E-44A9-8B3B-B0665B534353}" type="datetimeFigureOut">
               <a:rPr lang="en-US" smtClean="0"/>
-              <a:t>6/24/2024</a:t>
+              <a:t>7/19/2024</a:t>
             </a:fld>
             <a:endParaRPr lang="en-US"/>
           </a:p>
@@ -2087,7 +2087,7 @@
           <a:p>
             <a:fld id="{1D36DD91-353E-44A9-8B3B-B0665B534353}" type="datetimeFigureOut">
               <a:rPr lang="en-US" smtClean="0"/>
-              <a:t>6/24/2024</a:t>
+              <a:t>7/19/2024</a:t>
             </a:fld>
             <a:endParaRPr lang="en-US"/>
           </a:p>
@@ -2398,7 +2398,7 @@
           <a:p>
             <a:fld id="{1D36DD91-353E-44A9-8B3B-B0665B534353}" type="datetimeFigureOut">
               <a:rPr lang="en-US" smtClean="0"/>
-              <a:t>6/24/2024</a:t>
+              <a:t>7/19/2024</a:t>
             </a:fld>
             <a:endParaRPr lang="en-US"/>
           </a:p>
@@ -2686,7 +2686,7 @@
           <a:p>
             <a:fld id="{1D36DD91-353E-44A9-8B3B-B0665B534353}" type="datetimeFigureOut">
               <a:rPr lang="en-US" smtClean="0"/>
-              <a:t>6/24/2024</a:t>
+              <a:t>7/19/2024</a:t>
             </a:fld>
             <a:endParaRPr lang="en-US"/>
           </a:p>
@@ -2927,7 +2927,7 @@
           <a:p>
             <a:fld id="{1D36DD91-353E-44A9-8B3B-B0665B534353}" type="datetimeFigureOut">
               <a:rPr lang="en-US" smtClean="0"/>
-              <a:t>6/24/2024</a:t>
+              <a:t>7/19/2024</a:t>
             </a:fld>
             <a:endParaRPr lang="en-US"/>
           </a:p>
@@ -3505,10 +3505,10 @@
       </p:sp>
       <p:pic>
         <p:nvPicPr>
-          <p:cNvPr id="3" name="Picture 2" descr="A screenshot of a computer&#10;&#10;Description automatically generated">
-            <a:extLst>
-              <a:ext uri="{FF2B5EF4-FFF2-40B4-BE49-F238E27FC236}">
-                <a16:creationId xmlns:a16="http://schemas.microsoft.com/office/drawing/2014/main" id="{58A4AAAB-1D22-C8CE-157D-B9253C6F25A4}"/>
+          <p:cNvPr id="5" name="Picture 4" descr="A screenshot of a computer&#10;&#10;Description automatically generated">
+            <a:extLst>
+              <a:ext uri="{FF2B5EF4-FFF2-40B4-BE49-F238E27FC236}">
+                <a16:creationId xmlns:a16="http://schemas.microsoft.com/office/drawing/2014/main" id="{3FB5D3CC-5EF1-EB47-2421-736704191324}"/>
               </a:ext>
             </a:extLst>
           </p:cNvPr>
@@ -3531,8 +3531,8 @@
         </p:blipFill>
         <p:spPr>
           <a:xfrm>
-            <a:off x="1591871" y="317320"/>
-            <a:ext cx="9008258" cy="6385286"/>
+            <a:off x="1832738" y="248167"/>
+            <a:ext cx="8526524" cy="6523591"/>
           </a:xfrm>
           <a:prstGeom prst="rect">
             <a:avLst/>

</xml_diff>

<commit_message>
Updated omnirag-pattern.vsdx/png and CosmosAIGraph-v2.pptx/pdf
</commit_message>
<xml_diff>
--- a/presentations/CosmosAIGraph-v2.pptx
+++ b/presentations/CosmosAIGraph-v2.pptx
@@ -277,7 +277,7 @@
           <a:p>
             <a:fld id="{1D36DD91-353E-44A9-8B3B-B0665B534353}" type="datetimeFigureOut">
               <a:rPr lang="en-US" smtClean="0"/>
-              <a:t>9/4/2024</a:t>
+              <a:t>9/9/2024</a:t>
             </a:fld>
             <a:endParaRPr lang="en-US"/>
           </a:p>
@@ -475,7 +475,7 @@
           <a:p>
             <a:fld id="{1D36DD91-353E-44A9-8B3B-B0665B534353}" type="datetimeFigureOut">
               <a:rPr lang="en-US" smtClean="0"/>
-              <a:t>9/4/2024</a:t>
+              <a:t>9/9/2024</a:t>
             </a:fld>
             <a:endParaRPr lang="en-US"/>
           </a:p>
@@ -683,7 +683,7 @@
           <a:p>
             <a:fld id="{1D36DD91-353E-44A9-8B3B-B0665B534353}" type="datetimeFigureOut">
               <a:rPr lang="en-US" smtClean="0"/>
-              <a:t>9/4/2024</a:t>
+              <a:t>9/9/2024</a:t>
             </a:fld>
             <a:endParaRPr lang="en-US"/>
           </a:p>
@@ -881,7 +881,7 @@
           <a:p>
             <a:fld id="{1D36DD91-353E-44A9-8B3B-B0665B534353}" type="datetimeFigureOut">
               <a:rPr lang="en-US" smtClean="0"/>
-              <a:t>9/4/2024</a:t>
+              <a:t>9/9/2024</a:t>
             </a:fld>
             <a:endParaRPr lang="en-US"/>
           </a:p>
@@ -1156,7 +1156,7 @@
           <a:p>
             <a:fld id="{1D36DD91-353E-44A9-8B3B-B0665B534353}" type="datetimeFigureOut">
               <a:rPr lang="en-US" smtClean="0"/>
-              <a:t>9/4/2024</a:t>
+              <a:t>9/9/2024</a:t>
             </a:fld>
             <a:endParaRPr lang="en-US"/>
           </a:p>
@@ -1421,7 +1421,7 @@
           <a:p>
             <a:fld id="{1D36DD91-353E-44A9-8B3B-B0665B534353}" type="datetimeFigureOut">
               <a:rPr lang="en-US" smtClean="0"/>
-              <a:t>9/4/2024</a:t>
+              <a:t>9/9/2024</a:t>
             </a:fld>
             <a:endParaRPr lang="en-US"/>
           </a:p>
@@ -1833,7 +1833,7 @@
           <a:p>
             <a:fld id="{1D36DD91-353E-44A9-8B3B-B0665B534353}" type="datetimeFigureOut">
               <a:rPr lang="en-US" smtClean="0"/>
-              <a:t>9/4/2024</a:t>
+              <a:t>9/9/2024</a:t>
             </a:fld>
             <a:endParaRPr lang="en-US"/>
           </a:p>
@@ -1974,7 +1974,7 @@
           <a:p>
             <a:fld id="{1D36DD91-353E-44A9-8B3B-B0665B534353}" type="datetimeFigureOut">
               <a:rPr lang="en-US" smtClean="0"/>
-              <a:t>9/4/2024</a:t>
+              <a:t>9/9/2024</a:t>
             </a:fld>
             <a:endParaRPr lang="en-US"/>
           </a:p>
@@ -2087,7 +2087,7 @@
           <a:p>
             <a:fld id="{1D36DD91-353E-44A9-8B3B-B0665B534353}" type="datetimeFigureOut">
               <a:rPr lang="en-US" smtClean="0"/>
-              <a:t>9/4/2024</a:t>
+              <a:t>9/9/2024</a:t>
             </a:fld>
             <a:endParaRPr lang="en-US"/>
           </a:p>
@@ -2398,7 +2398,7 @@
           <a:p>
             <a:fld id="{1D36DD91-353E-44A9-8B3B-B0665B534353}" type="datetimeFigureOut">
               <a:rPr lang="en-US" smtClean="0"/>
-              <a:t>9/4/2024</a:t>
+              <a:t>9/9/2024</a:t>
             </a:fld>
             <a:endParaRPr lang="en-US"/>
           </a:p>
@@ -2686,7 +2686,7 @@
           <a:p>
             <a:fld id="{1D36DD91-353E-44A9-8B3B-B0665B534353}" type="datetimeFigureOut">
               <a:rPr lang="en-US" smtClean="0"/>
-              <a:t>9/4/2024</a:t>
+              <a:t>9/9/2024</a:t>
             </a:fld>
             <a:endParaRPr lang="en-US"/>
           </a:p>
@@ -2927,7 +2927,7 @@
           <a:p>
             <a:fld id="{1D36DD91-353E-44A9-8B3B-B0665B534353}" type="datetimeFigureOut">
               <a:rPr lang="en-US" smtClean="0"/>
-              <a:t>9/4/2024</a:t>
+              <a:t>9/9/2024</a:t>
             </a:fld>
             <a:endParaRPr lang="en-US"/>
           </a:p>
@@ -3505,10 +3505,10 @@
       </p:sp>
       <p:pic>
         <p:nvPicPr>
-          <p:cNvPr id="3" name="Picture 2" descr="A screenshot of a computer&#10;&#10;Description automatically generated">
-            <a:extLst>
-              <a:ext uri="{FF2B5EF4-FFF2-40B4-BE49-F238E27FC236}">
-                <a16:creationId xmlns:a16="http://schemas.microsoft.com/office/drawing/2014/main" id="{5DAE9768-4F7A-1C22-B385-E396E0ECBA12}"/>
+          <p:cNvPr id="5" name="Picture 4" descr="A screenshot of a computer&#10;&#10;Description automatically generated">
+            <a:extLst>
+              <a:ext uri="{FF2B5EF4-FFF2-40B4-BE49-F238E27FC236}">
+                <a16:creationId xmlns:a16="http://schemas.microsoft.com/office/drawing/2014/main" id="{75DDC76B-C962-AC9F-C108-05E40D6535A2}"/>
               </a:ext>
             </a:extLst>
           </p:cNvPr>
@@ -3531,8 +3531,8 @@
         </p:blipFill>
         <p:spPr>
           <a:xfrm>
-            <a:off x="1706871" y="92681"/>
-            <a:ext cx="8778257" cy="6672637"/>
+            <a:off x="1711444" y="45846"/>
+            <a:ext cx="8769112" cy="6664670"/>
           </a:xfrm>
           <a:prstGeom prst="rect">
             <a:avLst/>

</xml_diff>